<commit_message>
HTML documentation and the old deck to be updated.
</commit_message>
<xml_diff>
--- a/org.nasdanika.html.repository/src/site/resources/Nasdanika HTML.pptx
+++ b/org.nasdanika.html.repository/src/site/resources/Nasdanika HTML.pptx
@@ -3965,15 +3965,21 @@
           <a:p>
             <a:r>
               <a:rPr lang="en-US" dirty="0" smtClean="0"/>
-              <a:t>Fluent Java API for building HTML/Bootstrap Web UI</a:t>
-            </a:r>
-          </a:p>
-          <a:p>
+              <a:t>Fluent Java API for </a:t>
+            </a:r>
+            <a:r>
+              <a:rPr lang="en-US" smtClean="0"/>
+              <a:t>building </a:t>
+            </a:r>
+            <a:r>
+              <a:rPr lang="en-US" smtClean="0"/>
+              <a:t>Web </a:t>
+            </a:r>
             <a:r>
               <a:rPr lang="en-US" dirty="0" smtClean="0"/>
-              <a:t>v. 1.3.0</a:t>
-            </a:r>
-            <a:endParaRPr lang="en-US" dirty="0"/>
+              <a:t>UI</a:t>
+            </a:r>
+            <a:endParaRPr lang="en-US" dirty="0" smtClean="0"/>
           </a:p>
         </p:txBody>
       </p:sp>
@@ -4019,66 +4025,6 @@
               <a:tabLst/>
               <a:defRPr/>
             </a:pPr>
-            <a:r>
-              <a:rPr kumimoji="0" lang="en-US" sz="1600" b="0" i="0" u="none" strike="noStrike" kern="1200" cap="none" spc="0" normalizeH="0" baseline="0" noProof="0" dirty="0" smtClean="0">
-                <a:ln>
-                  <a:noFill/>
-                </a:ln>
-                <a:solidFill>
-                  <a:schemeClr val="bg2">
-                    <a:lumMod val="40000"/>
-                    <a:lumOff val="60000"/>
-                  </a:schemeClr>
-                </a:solidFill>
-                <a:effectLst/>
-                <a:uLnTx/>
-                <a:uFillTx/>
-                <a:latin typeface="+mn-lt"/>
-                <a:ea typeface="+mn-ea"/>
-                <a:cs typeface="+mn-cs"/>
-              </a:rPr>
-              <a:t>A component of </a:t>
-            </a:r>
-            <a:r>
-              <a:rPr kumimoji="0" lang="en-US" sz="1600" b="0" i="0" u="none" strike="noStrike" kern="1200" cap="none" spc="0" normalizeH="0" baseline="0" noProof="0" dirty="0" err="1" smtClean="0">
-                <a:ln>
-                  <a:noFill/>
-                </a:ln>
-                <a:solidFill>
-                  <a:schemeClr val="bg2">
-                    <a:lumMod val="40000"/>
-                    <a:lumOff val="60000"/>
-                  </a:schemeClr>
-                </a:solidFill>
-                <a:effectLst/>
-                <a:uLnTx/>
-                <a:uFillTx/>
-                <a:latin typeface="+mn-lt"/>
-                <a:ea typeface="+mn-ea"/>
-                <a:cs typeface="+mn-cs"/>
-              </a:rPr>
-              <a:t>Nasdanika</a:t>
-            </a:r>
-            <a:r>
-              <a:rPr kumimoji="0" lang="en-US" sz="1600" b="0" i="0" u="none" strike="noStrike" kern="1200" cap="none" spc="0" normalizeH="0" baseline="0" noProof="0" dirty="0" smtClean="0">
-                <a:ln>
-                  <a:noFill/>
-                </a:ln>
-                <a:solidFill>
-                  <a:schemeClr val="bg2">
-                    <a:lumMod val="40000"/>
-                    <a:lumOff val="60000"/>
-                  </a:schemeClr>
-                </a:solidFill>
-                <a:effectLst/>
-                <a:uLnTx/>
-                <a:uFillTx/>
-                <a:latin typeface="+mn-lt"/>
-                <a:ea typeface="+mn-ea"/>
-                <a:cs typeface="+mn-cs"/>
-              </a:rPr>
-              <a:t> Foundation Server</a:t>
-            </a:r>
             <a:endParaRPr kumimoji="0" lang="en-US" sz="1600" b="0" i="0" u="none" strike="noStrike" kern="1200" cap="none" spc="0" normalizeH="0" baseline="0" noProof="0" dirty="0">
               <a:ln>
                 <a:noFill/>

</xml_diff>